<commit_message>
screenshots y presentacion tarea2
</commit_message>
<xml_diff>
--- a/presentaciones/presentacion-tarea2/presentacion.pptx
+++ b/presentaciones/presentacion-tarea2/presentacion.pptx
@@ -17,7 +17,6 @@
     <p:sldId id="264" r:id="rId12"/>
     <p:sldId id="265" r:id="rId13"/>
     <p:sldId id="266" r:id="rId14"/>
-    <p:sldId id="267" r:id="rId15"/>
   </p:sldIdLst>
   <p:sldSz cx="10080625" cy="7559675"/>
   <p:notesSz cx="7559675" cy="10691812"/>
@@ -2968,7 +2967,43 @@
                 </a:solidFill>
                 <a:latin typeface="Noto Sans Regular"/>
               </a:rPr>
-              <a:t>Click to edit the title text format</a:t>
+              <a:t>Click to </a:t>
+            </a:r>
+            <a:r>
+              <a:rPr b="1" lang="en-US" sz="4800" spc="-1" strike="noStrike">
+                <a:solidFill>
+                  <a:srgbClr val="333333"/>
+                </a:solidFill>
+                <a:latin typeface="Noto Sans Regular"/>
+              </a:rPr>
+              <a:t>edit the </a:t>
+            </a:r>
+            <a:r>
+              <a:rPr b="1" lang="en-US" sz="4800" spc="-1" strike="noStrike">
+                <a:solidFill>
+                  <a:srgbClr val="333333"/>
+                </a:solidFill>
+                <a:latin typeface="Noto Sans Regular"/>
+              </a:rPr>
+              <a:t>title </a:t>
+            </a:r>
+            <a:r>
+              <a:rPr b="1" lang="en-US" sz="4800" spc="-1" strike="noStrike">
+                <a:solidFill>
+                  <a:srgbClr val="333333"/>
+                </a:solidFill>
+                <a:latin typeface="Noto Sans Regular"/>
+              </a:rPr>
+              <a:t>text </a:t>
+            </a:r>
+            <a:r>
+              <a:rPr b="1" lang="en-US" sz="4800" spc="-1" strike="noStrike">
+                <a:solidFill>
+                  <a:srgbClr val="333333"/>
+                </a:solidFill>
+                <a:latin typeface="Noto Sans Regular"/>
+              </a:rPr>
+              <a:t>format</a:t>
             </a:r>
             <a:endParaRPr b="1" lang="en-US" sz="4800" spc="-1" strike="noStrike">
               <a:solidFill>
@@ -3298,7 +3333,7 @@
           </a:bodyPr>
           <a:p>
             <a:pPr algn="r"/>
-            <a:fld id="{9D894D2F-15FC-423B-B905-DEE0EE80CAF3}" type="slidenum">
+            <a:fld id="{72EEBDB1-1FCE-4DD7-9282-F7A5652C07FE}" type="slidenum">
               <a:rPr b="0" lang="en-US" sz="1400" spc="-1" strike="noStrike">
                 <a:latin typeface="Noto Sans Regular"/>
               </a:rPr>
@@ -3310,11 +3345,11 @@
               </a:rPr>
               <a:t> / </a:t>
             </a:r>
-            <a:fld id="{ACE4D083-4989-4532-A75D-FA95C9E05A61}" type="slidecount">
+            <a:fld id="{83C27F61-47F1-4AAB-8D09-0DF687A46FF4}" type="slidecount">
               <a:rPr b="0" lang="en-US" sz="1400" spc="-1" strike="noStrike">
                 <a:latin typeface="Noto Sans Regular"/>
               </a:rPr>
-              <a:t>12</a:t>
+              <a:t>11</a:t>
             </a:fld>
             <a:endParaRPr b="0" lang="en-US" sz="1400" spc="-1" strike="noStrike">
               <a:latin typeface="Noto Sans Regular"/>
@@ -3748,7 +3783,7 @@
           </a:bodyPr>
           <a:p>
             <a:pPr algn="r"/>
-            <a:fld id="{277E46F8-D556-429B-86C0-FF8DBDFF1764}" type="slidenum">
+            <a:fld id="{FB6B4710-0872-4214-8D70-0BC05D4EA6D9}" type="slidenum">
               <a:rPr b="0" lang="en-US" sz="1400" spc="-1" strike="noStrike">
                 <a:latin typeface="Noto Sans Regular"/>
               </a:rPr>
@@ -3760,11 +3795,11 @@
               </a:rPr>
               <a:t> / </a:t>
             </a:r>
-            <a:fld id="{A9B496B4-7BC0-4307-8B9D-ACEAD19C6F25}" type="slidecount">
+            <a:fld id="{0D3D88E4-FC12-483C-8017-619A7EBD8AF9}" type="slidecount">
               <a:rPr b="0" lang="en-US" sz="1400" spc="-1" strike="noStrike">
                 <a:latin typeface="Noto Sans Regular"/>
               </a:rPr>
-              <a:t>12</a:t>
+              <a:t>11</a:t>
             </a:fld>
             <a:endParaRPr b="0" lang="en-US" sz="1400" spc="-1" strike="noStrike">
               <a:latin typeface="Noto Sans Regular"/>
@@ -4017,13 +4052,13 @@
       </p:grpSpPr>
       <p:sp>
         <p:nvSpPr>
-          <p:cNvPr id="117" name="TextShape 1"/>
+          <p:cNvPr id="115" name="TextShape 1"/>
           <p:cNvSpPr txBox="1"/>
           <p:nvPr/>
         </p:nvSpPr>
         <p:spPr>
           <a:xfrm>
-            <a:off x="7406640" y="367200"/>
+            <a:off x="7242120" y="91440"/>
             <a:ext cx="3090600" cy="1095840"/>
           </a:xfrm>
           <a:prstGeom prst="rect">
@@ -4040,70 +4075,37 @@
           </a:bodyPr>
           <a:p>
             <a:pPr algn="ctr"/>
-            <a:r>
-              <a:rPr b="0" lang="en-US" sz="2200" spc="-1" strike="noStrike">
+            <a:endParaRPr b="0" lang="en-US" sz="1800" spc="-1" strike="noStrike">
+              <a:latin typeface="Arial"/>
+            </a:endParaRPr>
+          </a:p>
+          <a:p>
+            <a:pPr algn="ctr"/>
+            <a:r>
+              <a:rPr b="0" lang="en-US" sz="3200" spc="-1" strike="noStrike">
                 <a:solidFill>
                   <a:srgbClr val="ff0000"/>
                 </a:solidFill>
                 <a:latin typeface="Cantarell Extra Bold"/>
               </a:rPr>
-              <a:t>Evaluador</a:t>
-            </a:r>
-            <a:endParaRPr b="0" lang="en-US" sz="2200" spc="-1" strike="noStrike">
-              <a:solidFill>
-                <a:srgbClr val="ff0000"/>
-              </a:solidFill>
-              <a:latin typeface="Cantarell Extra Bold"/>
-            </a:endParaRPr>
-          </a:p>
-          <a:p>
-            <a:pPr algn="ctr"/>
-            <a:r>
-              <a:rPr b="0" lang="en-US" sz="2200" spc="-1" strike="noStrike">
-                <a:solidFill>
-                  <a:srgbClr val="ff0000"/>
-                </a:solidFill>
-                <a:latin typeface="Cantarell Extra Bold"/>
-              </a:rPr>
-              <a:t>Desde el</a:t>
-            </a:r>
-            <a:endParaRPr b="0" lang="en-US" sz="2200" spc="-1" strike="noStrike">
-              <a:solidFill>
-                <a:srgbClr val="ff0000"/>
-              </a:solidFill>
-              <a:latin typeface="Cantarell Extra Bold"/>
-            </a:endParaRPr>
-          </a:p>
-          <a:p>
-            <a:pPr algn="ctr"/>
-            <a:r>
-              <a:rPr b="0" lang="en-US" sz="2200" spc="-1" strike="noStrike">
-                <a:solidFill>
-                  <a:srgbClr val="ff0000"/>
-                </a:solidFill>
-                <a:latin typeface="Cantarell Extra Bold"/>
-              </a:rPr>
-              <a:t>Celular</a:t>
-            </a:r>
-            <a:endParaRPr b="0" lang="en-US" sz="2200" spc="-1" strike="noStrike">
-              <a:solidFill>
-                <a:srgbClr val="ff0000"/>
-              </a:solidFill>
-              <a:latin typeface="Cantarell Extra Bold"/>
-            </a:endParaRPr>
-          </a:p>
-        </p:txBody>
-      </p:sp>
-      <p:sp>
-        <p:nvSpPr>
-          <p:cNvPr id="118" name="TextShape 2"/>
+              <a:t>Estudiante</a:t>
+            </a:r>
+            <a:endParaRPr b="0" lang="en-US" sz="3200" spc="-1" strike="noStrike">
+              <a:latin typeface="Arial"/>
+            </a:endParaRPr>
+          </a:p>
+        </p:txBody>
+      </p:sp>
+      <p:sp>
+        <p:nvSpPr>
+          <p:cNvPr id="116" name="TextShape 2"/>
           <p:cNvSpPr txBox="1"/>
           <p:nvPr/>
         </p:nvSpPr>
         <p:spPr>
           <a:xfrm>
-            <a:off x="640080" y="277200"/>
-            <a:ext cx="7040880" cy="1183320"/>
+            <a:off x="822960" y="277200"/>
+            <a:ext cx="6492240" cy="1183320"/>
           </a:xfrm>
           <a:prstGeom prst="rect">
             <a:avLst/>
@@ -4121,6 +4123,7 @@
             <a:spAutoFit/>
           </a:bodyPr>
           <a:p>
+            <a:pPr algn="ctr"/>
             <a:r>
               <a:rPr b="1" lang="en-US" sz="3200" spc="-1" strike="noStrike">
                 <a:solidFill>
@@ -4137,7 +4140,7 @@
                 </a:solidFill>
                 <a:latin typeface="Noto Sans Regular"/>
               </a:rPr>
-              <a:t>Ficha de una evaluación (4)</a:t>
+              <a:t>Ficha de un resumen de evaluación (1)</a:t>
             </a:r>
             <a:endParaRPr b="1" lang="en-US" sz="3200" spc="-1" strike="noStrike">
               <a:solidFill>
@@ -4150,7 +4153,7 @@
       </p:sp>
       <p:pic>
         <p:nvPicPr>
-          <p:cNvPr id="119" name="" descr=""/>
+          <p:cNvPr id="117" name="" descr=""/>
           <p:cNvPicPr/>
           <p:nvPr/>
         </p:nvPicPr>
@@ -4160,8 +4163,8 @@
         </p:blipFill>
         <p:spPr>
           <a:xfrm>
-            <a:off x="962280" y="1723320"/>
-            <a:ext cx="2329560" cy="4794480"/>
+            <a:off x="731520" y="1810800"/>
+            <a:ext cx="8595360" cy="4681440"/>
           </a:xfrm>
           <a:prstGeom prst="rect">
             <a:avLst/>
@@ -4171,108 +4174,6 @@
           </a:ln>
         </p:spPr>
       </p:pic>
-      <p:pic>
-        <p:nvPicPr>
-          <p:cNvPr id="120" name="" descr=""/>
-          <p:cNvPicPr/>
-          <p:nvPr/>
-        </p:nvPicPr>
-        <p:blipFill>
-          <a:blip r:embed="rId2"/>
-          <a:stretch/>
-        </p:blipFill>
-        <p:spPr>
-          <a:xfrm>
-            <a:off x="3840480" y="1645920"/>
-            <a:ext cx="2398680" cy="4937760"/>
-          </a:xfrm>
-          <a:prstGeom prst="rect">
-            <a:avLst/>
-          </a:prstGeom>
-          <a:ln>
-            <a:noFill/>
-          </a:ln>
-        </p:spPr>
-      </p:pic>
-      <p:pic>
-        <p:nvPicPr>
-          <p:cNvPr id="121" name="" descr=""/>
-          <p:cNvPicPr/>
-          <p:nvPr/>
-        </p:nvPicPr>
-        <p:blipFill>
-          <a:blip r:embed="rId3"/>
-          <a:stretch/>
-        </p:blipFill>
-        <p:spPr>
-          <a:xfrm>
-            <a:off x="6990840" y="1645920"/>
-            <a:ext cx="2329560" cy="4794480"/>
-          </a:xfrm>
-          <a:prstGeom prst="rect">
-            <a:avLst/>
-          </a:prstGeom>
-          <a:ln>
-            <a:noFill/>
-          </a:ln>
-        </p:spPr>
-      </p:pic>
-      <p:sp>
-        <p:nvSpPr>
-          <p:cNvPr id="122" name="Line 3"/>
-          <p:cNvSpPr/>
-          <p:nvPr/>
-        </p:nvSpPr>
-        <p:spPr>
-          <a:xfrm>
-            <a:off x="3474720" y="1678680"/>
-            <a:ext cx="0" cy="4722120"/>
-          </a:xfrm>
-          <a:prstGeom prst="line">
-            <a:avLst/>
-          </a:prstGeom>
-          <a:ln w="57240">
-            <a:solidFill>
-              <a:srgbClr val="000000"/>
-            </a:solidFill>
-            <a:round/>
-          </a:ln>
-        </p:spPr>
-        <p:style>
-          <a:lnRef idx="0"/>
-          <a:fillRef idx="0"/>
-          <a:effectRef idx="0"/>
-          <a:fontRef idx="minor"/>
-        </p:style>
-      </p:sp>
-      <p:sp>
-        <p:nvSpPr>
-          <p:cNvPr id="123" name="Line 4"/>
-          <p:cNvSpPr/>
-          <p:nvPr/>
-        </p:nvSpPr>
-        <p:spPr>
-          <a:xfrm>
-            <a:off x="6675120" y="1678680"/>
-            <a:ext cx="0" cy="4722120"/>
-          </a:xfrm>
-          <a:prstGeom prst="line">
-            <a:avLst/>
-          </a:prstGeom>
-          <a:ln w="57240">
-            <a:solidFill>
-              <a:srgbClr val="000000"/>
-            </a:solidFill>
-            <a:round/>
-          </a:ln>
-        </p:spPr>
-        <p:style>
-          <a:lnRef idx="0"/>
-          <a:fillRef idx="0"/>
-          <a:effectRef idx="0"/>
-          <a:fontRef idx="minor"/>
-        </p:style>
-      </p:sp>
     </p:spTree>
   </p:cSld>
   <mc:AlternateContent>
@@ -4332,7 +4233,7 @@
       </p:grpSpPr>
       <p:sp>
         <p:nvSpPr>
-          <p:cNvPr id="124" name="TextShape 1"/>
+          <p:cNvPr id="118" name="TextShape 1"/>
           <p:cNvSpPr txBox="1"/>
           <p:nvPr/>
         </p:nvSpPr>
@@ -4355,36 +4256,111 @@
           </a:bodyPr>
           <a:p>
             <a:pPr algn="ctr"/>
+            <a:endParaRPr b="0" lang="en-US" sz="1800" spc="-1" strike="noStrike">
+              <a:latin typeface="Arial"/>
+            </a:endParaRPr>
+          </a:p>
+          <a:p>
+            <a:pPr algn="ctr"/>
+            <a:r>
+              <a:rPr b="0" lang="en-US" sz="3200" spc="-1" strike="noStrike">
+                <a:solidFill>
+                  <a:srgbClr val="ff0000"/>
+                </a:solidFill>
+                <a:latin typeface="Cantarell Extra Bold"/>
+              </a:rPr>
+              <a:t>E</a:t>
+            </a:r>
+            <a:r>
+              <a:rPr b="0" lang="en-US" sz="3200" spc="-1" strike="noStrike">
+                <a:solidFill>
+                  <a:srgbClr val="ff0000"/>
+                </a:solidFill>
+                <a:latin typeface="Cantarell Extra Bold"/>
+              </a:rPr>
+              <a:t>s</a:t>
+            </a:r>
+            <a:r>
+              <a:rPr b="0" lang="en-US" sz="3200" spc="-1" strike="noStrike">
+                <a:solidFill>
+                  <a:srgbClr val="ff0000"/>
+                </a:solidFill>
+                <a:latin typeface="Cantarell Extra Bold"/>
+              </a:rPr>
+              <a:t>t</a:t>
+            </a:r>
+            <a:r>
+              <a:rPr b="0" lang="en-US" sz="3200" spc="-1" strike="noStrike">
+                <a:solidFill>
+                  <a:srgbClr val="ff0000"/>
+                </a:solidFill>
+                <a:latin typeface="Cantarell Extra Bold"/>
+              </a:rPr>
+              <a:t>u</a:t>
+            </a:r>
+            <a:r>
+              <a:rPr b="0" lang="en-US" sz="3200" spc="-1" strike="noStrike">
+                <a:solidFill>
+                  <a:srgbClr val="ff0000"/>
+                </a:solidFill>
+                <a:latin typeface="Cantarell Extra Bold"/>
+              </a:rPr>
+              <a:t>d</a:t>
+            </a:r>
+            <a:r>
+              <a:rPr b="0" lang="en-US" sz="3200" spc="-1" strike="noStrike">
+                <a:solidFill>
+                  <a:srgbClr val="ff0000"/>
+                </a:solidFill>
+                <a:latin typeface="Cantarell Extra Bold"/>
+              </a:rPr>
+              <a:t>i</a:t>
+            </a:r>
+            <a:r>
+              <a:rPr b="0" lang="en-US" sz="3200" spc="-1" strike="noStrike">
+                <a:solidFill>
+                  <a:srgbClr val="ff0000"/>
+                </a:solidFill>
+                <a:latin typeface="Cantarell Extra Bold"/>
+              </a:rPr>
+              <a:t>a</a:t>
+            </a:r>
+            <a:r>
+              <a:rPr b="0" lang="en-US" sz="3200" spc="-1" strike="noStrike">
+                <a:solidFill>
+                  <a:srgbClr val="ff0000"/>
+                </a:solidFill>
+                <a:latin typeface="Cantarell Extra Bold"/>
+              </a:rPr>
+              <a:t>n</a:t>
+            </a:r>
+            <a:r>
+              <a:rPr b="0" lang="en-US" sz="3200" spc="-1" strike="noStrike">
+                <a:solidFill>
+                  <a:srgbClr val="ff0000"/>
+                </a:solidFill>
+                <a:latin typeface="Cantarell Extra Bold"/>
+              </a:rPr>
+              <a:t>t</a:t>
+            </a:r>
+            <a:r>
+              <a:rPr b="0" lang="en-US" sz="3200" spc="-1" strike="noStrike">
+                <a:solidFill>
+                  <a:srgbClr val="ff0000"/>
+                </a:solidFill>
+                <a:latin typeface="Cantarell Extra Bold"/>
+              </a:rPr>
+              <a:t>e</a:t>
+            </a:r>
             <a:endParaRPr b="0" lang="en-US" sz="3200" spc="-1" strike="noStrike">
-              <a:solidFill>
-                <a:srgbClr val="ff0000"/>
-              </a:solidFill>
-              <a:latin typeface="Cantarell Extra Bold"/>
-            </a:endParaRPr>
-          </a:p>
-          <a:p>
-            <a:pPr algn="ctr"/>
-            <a:r>
-              <a:rPr b="0" lang="en-US" sz="3200" spc="-1" strike="noStrike">
-                <a:solidFill>
-                  <a:srgbClr val="ff0000"/>
-                </a:solidFill>
-                <a:latin typeface="Cantarell Extra Bold"/>
-              </a:rPr>
-              <a:t>Estudiante</a:t>
-            </a:r>
-            <a:endParaRPr b="0" lang="en-US" sz="3200" spc="-1" strike="noStrike">
-              <a:solidFill>
-                <a:srgbClr val="ff0000"/>
-              </a:solidFill>
-              <a:latin typeface="Cantarell Extra Bold"/>
-            </a:endParaRPr>
-          </a:p>
-        </p:txBody>
-      </p:sp>
-      <p:sp>
-        <p:nvSpPr>
-          <p:cNvPr id="125" name="TextShape 2"/>
+              <a:latin typeface="Arial"/>
+            </a:endParaRPr>
+          </a:p>
+        </p:txBody>
+      </p:sp>
+      <p:sp>
+        <p:nvSpPr>
+          <p:cNvPr id="119" name="TextShape 2"/>
           <p:cNvSpPr txBox="1"/>
           <p:nvPr/>
         </p:nvSpPr>
@@ -4426,7 +4402,25 @@
                 </a:solidFill>
                 <a:latin typeface="Noto Sans Regular"/>
               </a:rPr>
-              <a:t>Ficha de un resumen de evaluación (1)</a:t>
+              <a:t>Ficha de un </a:t>
+            </a:r>
+            <a:r>
+              <a:rPr b="1" lang="en-US" sz="3200" spc="-1" strike="noStrike">
+                <a:solidFill>
+                  <a:srgbClr val="333333"/>
+                </a:solidFill>
+                <a:latin typeface="Noto Sans Regular"/>
+              </a:rPr>
+              <a:t>resumen de </a:t>
+            </a:r>
+            <a:r>
+              <a:rPr b="1" lang="en-US" sz="3200" spc="-1" strike="noStrike">
+                <a:solidFill>
+                  <a:srgbClr val="333333"/>
+                </a:solidFill>
+                <a:latin typeface="Noto Sans Regular"/>
+              </a:rPr>
+              <a:t>evaluación (2)</a:t>
             </a:r>
             <a:endParaRPr b="1" lang="en-US" sz="3200" spc="-1" strike="noStrike">
               <a:solidFill>
@@ -4439,7 +4433,7 @@
       </p:sp>
       <p:pic>
         <p:nvPicPr>
-          <p:cNvPr id="126" name="" descr=""/>
+          <p:cNvPr id="120" name="" descr=""/>
           <p:cNvPicPr/>
           <p:nvPr/>
         </p:nvPicPr>
@@ -4449,8 +4443,8 @@
         </p:blipFill>
         <p:spPr>
           <a:xfrm>
-            <a:off x="274320" y="1775520"/>
-            <a:ext cx="4754880" cy="4625280"/>
+            <a:off x="1463040" y="1645920"/>
+            <a:ext cx="7223760" cy="5034600"/>
           </a:xfrm>
           <a:prstGeom prst="rect">
             <a:avLst/>
@@ -4460,57 +4454,6 @@
           </a:ln>
         </p:spPr>
       </p:pic>
-      <p:pic>
-        <p:nvPicPr>
-          <p:cNvPr id="127" name="" descr=""/>
-          <p:cNvPicPr/>
-          <p:nvPr/>
-        </p:nvPicPr>
-        <p:blipFill>
-          <a:blip r:embed="rId2"/>
-          <a:stretch/>
-        </p:blipFill>
-        <p:spPr>
-          <a:xfrm>
-            <a:off x="5303520" y="1737360"/>
-            <a:ext cx="4846320" cy="4837680"/>
-          </a:xfrm>
-          <a:prstGeom prst="rect">
-            <a:avLst/>
-          </a:prstGeom>
-          <a:ln>
-            <a:noFill/>
-          </a:ln>
-        </p:spPr>
-      </p:pic>
-      <p:sp>
-        <p:nvSpPr>
-          <p:cNvPr id="128" name="Line 3"/>
-          <p:cNvSpPr/>
-          <p:nvPr/>
-        </p:nvSpPr>
-        <p:spPr>
-          <a:xfrm>
-            <a:off x="5029200" y="1770120"/>
-            <a:ext cx="0" cy="4722120"/>
-          </a:xfrm>
-          <a:prstGeom prst="line">
-            <a:avLst/>
-          </a:prstGeom>
-          <a:ln w="57240">
-            <a:solidFill>
-              <a:srgbClr val="000000"/>
-            </a:solidFill>
-            <a:round/>
-          </a:ln>
-        </p:spPr>
-        <p:style>
-          <a:lnRef idx="0"/>
-          <a:fillRef idx="0"/>
-          <a:effectRef idx="0"/>
-          <a:fontRef idx="minor"/>
-        </p:style>
-      </p:sp>
     </p:spTree>
   </p:cSld>
   <mc:AlternateContent>
@@ -4551,193 +4494,6 @@
 </p:sld>
 </file>
 
-<file path=ppt/slides/slide12.xml><?xml version="1.0" encoding="utf-8"?>
-<p:sld xmlns:a="http://schemas.openxmlformats.org/drawingml/2006/main" xmlns:p="http://schemas.openxmlformats.org/presentationml/2006/main" xmlns:r="http://schemas.openxmlformats.org/officeDocument/2006/relationships" xmlns:p14="http://schemas.microsoft.com/office/powerpoint/2010/main" xmlns:p15="http://schemas.microsoft.com/office/powerpoint/2012/main" xmlns:mc="http://schemas.openxmlformats.org/markup-compatibility/2006">
-  <p:cSld>
-    <p:spTree>
-      <p:nvGrpSpPr>
-        <p:cNvPr id="1" name=""/>
-        <p:cNvGrpSpPr/>
-        <p:nvPr/>
-      </p:nvGrpSpPr>
-      <p:grpSpPr>
-        <a:xfrm>
-          <a:off x="0" y="0"/>
-          <a:ext cx="0" cy="0"/>
-          <a:chOff x="0" y="0"/>
-          <a:chExt cx="0" cy="0"/>
-        </a:xfrm>
-      </p:grpSpPr>
-      <p:sp>
-        <p:nvSpPr>
-          <p:cNvPr id="129" name="TextShape 1"/>
-          <p:cNvSpPr txBox="1"/>
-          <p:nvPr/>
-        </p:nvSpPr>
-        <p:spPr>
-          <a:xfrm>
-            <a:off x="7242120" y="91440"/>
-            <a:ext cx="3090600" cy="1095840"/>
-          </a:xfrm>
-          <a:prstGeom prst="rect">
-            <a:avLst/>
-          </a:prstGeom>
-          <a:noFill/>
-          <a:ln>
-            <a:noFill/>
-          </a:ln>
-        </p:spPr>
-        <p:txBody>
-          <a:bodyPr lIns="90000" rIns="90000" tIns="45000" bIns="45000">
-            <a:spAutoFit/>
-          </a:bodyPr>
-          <a:p>
-            <a:pPr algn="ctr"/>
-            <a:endParaRPr b="0" lang="en-US" sz="3200" spc="-1" strike="noStrike">
-              <a:solidFill>
-                <a:srgbClr val="ff0000"/>
-              </a:solidFill>
-              <a:latin typeface="Cantarell Extra Bold"/>
-            </a:endParaRPr>
-          </a:p>
-          <a:p>
-            <a:pPr algn="ctr"/>
-            <a:r>
-              <a:rPr b="0" lang="en-US" sz="3200" spc="-1" strike="noStrike">
-                <a:solidFill>
-                  <a:srgbClr val="ff0000"/>
-                </a:solidFill>
-                <a:latin typeface="Cantarell Extra Bold"/>
-              </a:rPr>
-              <a:t>Estudiante</a:t>
-            </a:r>
-            <a:endParaRPr b="0" lang="en-US" sz="3200" spc="-1" strike="noStrike">
-              <a:solidFill>
-                <a:srgbClr val="ff0000"/>
-              </a:solidFill>
-              <a:latin typeface="Cantarell Extra Bold"/>
-            </a:endParaRPr>
-          </a:p>
-        </p:txBody>
-      </p:sp>
-      <p:sp>
-        <p:nvSpPr>
-          <p:cNvPr id="130" name="TextShape 2"/>
-          <p:cNvSpPr txBox="1"/>
-          <p:nvPr/>
-        </p:nvSpPr>
-        <p:spPr>
-          <a:xfrm>
-            <a:off x="822960" y="277200"/>
-            <a:ext cx="6492240" cy="1183320"/>
-          </a:xfrm>
-          <a:prstGeom prst="rect">
-            <a:avLst/>
-          </a:prstGeom>
-          <a:noFill/>
-          <a:ln w="76320">
-            <a:solidFill>
-              <a:srgbClr val="000000"/>
-            </a:solidFill>
-            <a:round/>
-          </a:ln>
-        </p:spPr>
-        <p:txBody>
-          <a:bodyPr lIns="38160" rIns="38160" tIns="38160" bIns="38160" anchor="ctr">
-            <a:spAutoFit/>
-          </a:bodyPr>
-          <a:p>
-            <a:pPr algn="ctr"/>
-            <a:r>
-              <a:rPr b="1" lang="en-US" sz="3200" spc="-1" strike="noStrike">
-                <a:solidFill>
-                  <a:srgbClr val="333333"/>
-                </a:solidFill>
-                <a:latin typeface="Noto Sans Regular"/>
-              </a:rPr>
-              <a:t> </a:t>
-            </a:r>
-            <a:r>
-              <a:rPr b="1" lang="en-US" sz="3200" spc="-1" strike="noStrike">
-                <a:solidFill>
-                  <a:srgbClr val="333333"/>
-                </a:solidFill>
-                <a:latin typeface="Noto Sans Regular"/>
-              </a:rPr>
-              <a:t>Ficha de un resumen de evaluación (2)</a:t>
-            </a:r>
-            <a:endParaRPr b="1" lang="en-US" sz="3200" spc="-1" strike="noStrike">
-              <a:solidFill>
-                <a:srgbClr val="333333"/>
-              </a:solidFill>
-              <a:latin typeface="Noto Sans Regular"/>
-            </a:endParaRPr>
-          </a:p>
-        </p:txBody>
-      </p:sp>
-      <p:pic>
-        <p:nvPicPr>
-          <p:cNvPr id="131" name="" descr=""/>
-          <p:cNvPicPr/>
-          <p:nvPr/>
-        </p:nvPicPr>
-        <p:blipFill>
-          <a:blip r:embed="rId1"/>
-          <a:stretch/>
-        </p:blipFill>
-        <p:spPr>
-          <a:xfrm>
-            <a:off x="530280" y="1792080"/>
-            <a:ext cx="8888040" cy="4864680"/>
-          </a:xfrm>
-          <a:prstGeom prst="rect">
-            <a:avLst/>
-          </a:prstGeom>
-          <a:ln>
-            <a:noFill/>
-          </a:ln>
-        </p:spPr>
-      </p:pic>
-    </p:spTree>
-  </p:cSld>
-  <mc:AlternateContent>
-    <mc:Choice Requires="p14">
-      <p:transition spd="slow" p14:dur="2000"/>
-    </mc:Choice>
-    <mc:Fallback>
-      <p:transition spd="slow"/>
-    </mc:Fallback>
-  </mc:AlternateContent>
-  <p:timing>
-    <p:tnLst>
-      <p:par>
-        <p:cTn id="23" dur="indefinite" restart="never" nodeType="tmRoot">
-          <p:childTnLst>
-            <p:seq>
-              <p:cTn id="24" dur="indefinite" nodeType="mainSeq"/>
-              <p:prevCondLst>
-                <p:cond delay="0" evt="onPrev">
-                  <p:tgtEl>
-                    <p:sldTgt/>
-                  </p:tgtEl>
-                </p:cond>
-              </p:prevCondLst>
-              <p:nextCondLst>
-                <p:cond delay="0" evt="onNext">
-                  <p:tgtEl>
-                    <p:sldTgt/>
-                  </p:tgtEl>
-                </p:cond>
-              </p:nextCondLst>
-            </p:seq>
-          </p:childTnLst>
-        </p:cTn>
-      </p:par>
-    </p:tnLst>
-  </p:timing>
-</p:sld>
-</file>
-
 <file path=ppt/slides/slide2.xml><?xml version="1.0" encoding="utf-8"?>
 <p:sld xmlns:a="http://schemas.openxmlformats.org/drawingml/2006/main" xmlns:p="http://schemas.openxmlformats.org/presentationml/2006/main" xmlns:r="http://schemas.openxmlformats.org/officeDocument/2006/relationships" xmlns:p14="http://schemas.microsoft.com/office/powerpoint/2010/main" xmlns:p15="http://schemas.microsoft.com/office/powerpoint/2012/main" xmlns:mc="http://schemas.openxmlformats.org/markup-compatibility/2006">
   <p:cSld>
@@ -4755,9 +4511,63 @@
           <a:chExt cx="0" cy="0"/>
         </a:xfrm>
       </p:grpSpPr>
+      <p:sp>
+        <p:nvSpPr>
+          <p:cNvPr id="86" name="TextShape 1"/>
+          <p:cNvSpPr txBox="1"/>
+          <p:nvPr/>
+        </p:nvSpPr>
+        <p:spPr>
+          <a:xfrm>
+            <a:off x="822960" y="215640"/>
+            <a:ext cx="6021000" cy="1338840"/>
+          </a:xfrm>
+          <a:prstGeom prst="rect">
+            <a:avLst/>
+          </a:prstGeom>
+          <a:noFill/>
+          <a:ln w="76320">
+            <a:solidFill>
+              <a:srgbClr val="000000"/>
+            </a:solidFill>
+            <a:round/>
+          </a:ln>
+        </p:spPr>
+        <p:txBody>
+          <a:bodyPr lIns="38160" rIns="38160" tIns="38160" bIns="38160" anchor="ctr">
+            <a:spAutoFit/>
+          </a:bodyPr>
+          <a:p>
+            <a:r>
+              <a:rPr b="1" lang="en-US" sz="3200" spc="-1" strike="noStrike">
+                <a:solidFill>
+                  <a:srgbClr val="333333"/>
+                </a:solidFill>
+                <a:latin typeface="Noto Sans Regular"/>
+              </a:rPr>
+              <a:t> </a:t>
+            </a:r>
+            <a:r>
+              <a:rPr b="1" lang="en-US" sz="3200" spc="-1" strike="noStrike">
+                <a:solidFill>
+                  <a:srgbClr val="333333"/>
+                </a:solidFill>
+                <a:latin typeface="Noto Sans Regular"/>
+              </a:rPr>
+              <a:t>Landing Administrador</a:t>
+            </a:r>
+            <a:endParaRPr b="1" lang="en-US" sz="3200" spc="-1" strike="noStrike">
+              <a:solidFill>
+                <a:srgbClr val="333333"/>
+              </a:solidFill>
+              <a:latin typeface="Noto Sans Regular"/>
+            </a:endParaRPr>
+          </a:p>
+        </p:txBody>
+      </p:sp>
       <p:pic>
         <p:nvPicPr>
-          <p:cNvPr id="86" name="" descr=""/>
+          <p:cNvPr id="87" name="" descr=""/>
           <p:cNvPicPr/>
           <p:nvPr/>
         </p:nvPicPr>
@@ -4767,8 +4577,8 @@
         </p:blipFill>
         <p:spPr>
           <a:xfrm>
-            <a:off x="1645920" y="640080"/>
-            <a:ext cx="3695400" cy="5819400"/>
+            <a:off x="237600" y="1805760"/>
+            <a:ext cx="9582840" cy="4956120"/>
           </a:xfrm>
           <a:prstGeom prst="rect">
             <a:avLst/>
@@ -4778,111 +4588,6 @@
           </a:ln>
         </p:spPr>
       </p:pic>
-      <p:pic>
-        <p:nvPicPr>
-          <p:cNvPr id="87" name="" descr=""/>
-          <p:cNvPicPr/>
-          <p:nvPr/>
-        </p:nvPicPr>
-        <p:blipFill>
-          <a:blip r:embed="rId2"/>
-          <a:stretch/>
-        </p:blipFill>
-        <p:spPr>
-          <a:xfrm>
-            <a:off x="5852160" y="1478160"/>
-            <a:ext cx="3466800" cy="4819320"/>
-          </a:xfrm>
-          <a:prstGeom prst="rect">
-            <a:avLst/>
-          </a:prstGeom>
-          <a:ln>
-            <a:noFill/>
-          </a:ln>
-        </p:spPr>
-      </p:pic>
-      <p:sp>
-        <p:nvSpPr>
-          <p:cNvPr id="88" name="TextShape 1"/>
-          <p:cNvSpPr txBox="1"/>
-          <p:nvPr/>
-        </p:nvSpPr>
-        <p:spPr>
-          <a:xfrm>
-            <a:off x="3937320" y="124200"/>
-            <a:ext cx="6021000" cy="1338840"/>
-          </a:xfrm>
-          <a:prstGeom prst="rect">
-            <a:avLst/>
-          </a:prstGeom>
-          <a:noFill/>
-          <a:ln w="76320">
-            <a:solidFill>
-              <a:srgbClr val="000000"/>
-            </a:solidFill>
-            <a:round/>
-          </a:ln>
-        </p:spPr>
-        <p:txBody>
-          <a:bodyPr lIns="38160" rIns="38160" tIns="38160" bIns="38160" anchor="ctr">
-            <a:spAutoFit/>
-          </a:bodyPr>
-          <a:p>
-            <a:r>
-              <a:rPr b="1" lang="en-US" sz="3200" spc="-1" strike="noStrike">
-                <a:solidFill>
-                  <a:srgbClr val="333333"/>
-                </a:solidFill>
-                <a:latin typeface="Noto Sans Regular"/>
-              </a:rPr>
-              <a:t> </a:t>
-            </a:r>
-            <a:r>
-              <a:rPr b="1" lang="en-US" sz="3200" spc="-1" strike="noStrike">
-                <a:solidFill>
-                  <a:srgbClr val="333333"/>
-                </a:solidFill>
-                <a:latin typeface="Noto Sans Regular"/>
-              </a:rPr>
-              <a:t>Landing Administrador</a:t>
-            </a:r>
-            <a:endParaRPr b="1" lang="en-US" sz="3200" spc="-1" strike="noStrike">
-              <a:solidFill>
-                <a:srgbClr val="333333"/>
-              </a:solidFill>
-              <a:latin typeface="Noto Sans Regular"/>
-            </a:endParaRPr>
-          </a:p>
-        </p:txBody>
-      </p:sp>
-      <p:sp>
-        <p:nvSpPr>
-          <p:cNvPr id="89" name="Line 2"/>
-          <p:cNvSpPr/>
-          <p:nvPr/>
-        </p:nvSpPr>
-        <p:spPr>
-          <a:xfrm>
-            <a:off x="5341320" y="1737360"/>
-            <a:ext cx="0" cy="4722120"/>
-          </a:xfrm>
-          <a:prstGeom prst="line">
-            <a:avLst/>
-          </a:prstGeom>
-          <a:ln w="57240">
-            <a:solidFill>
-              <a:srgbClr val="000000"/>
-            </a:solidFill>
-            <a:round/>
-          </a:ln>
-        </p:spPr>
-        <p:style>
-          <a:lnRef idx="0"/>
-          <a:fillRef idx="0"/>
-          <a:effectRef idx="0"/>
-          <a:fontRef idx="minor"/>
-        </p:style>
-      </p:sp>
     </p:spTree>
   </p:cSld>
   <mc:AlternateContent>
@@ -4940,6 +4645,112 @@
           <a:chExt cx="0" cy="0"/>
         </a:xfrm>
       </p:grpSpPr>
+      <p:sp>
+        <p:nvSpPr>
+          <p:cNvPr id="88" name="TextShape 1"/>
+          <p:cNvSpPr txBox="1"/>
+          <p:nvPr/>
+        </p:nvSpPr>
+        <p:spPr>
+          <a:xfrm>
+            <a:off x="6640200" y="367200"/>
+            <a:ext cx="3090600" cy="1095840"/>
+          </a:xfrm>
+          <a:prstGeom prst="rect">
+            <a:avLst/>
+          </a:prstGeom>
+          <a:noFill/>
+          <a:ln>
+            <a:noFill/>
+          </a:ln>
+        </p:spPr>
+        <p:txBody>
+          <a:bodyPr lIns="90000" rIns="90000" tIns="45000" bIns="45000">
+            <a:spAutoFit/>
+          </a:bodyPr>
+          <a:p>
+            <a:pPr algn="ctr"/>
+            <a:endParaRPr b="0" lang="en-US" sz="1800" spc="-1" strike="noStrike">
+              <a:latin typeface="Arial"/>
+            </a:endParaRPr>
+          </a:p>
+          <a:p>
+            <a:pPr algn="ctr"/>
+            <a:r>
+              <a:rPr b="0" lang="en-US" sz="2200" spc="-1" strike="noStrike">
+                <a:solidFill>
+                  <a:srgbClr val="ff0000"/>
+                </a:solidFill>
+                <a:latin typeface="Cantarell Extra Bold"/>
+              </a:rPr>
+              <a:t>Administrador </a:t>
+            </a:r>
+            <a:endParaRPr b="0" lang="en-US" sz="2200" spc="-1" strike="noStrike">
+              <a:latin typeface="Arial"/>
+            </a:endParaRPr>
+          </a:p>
+          <a:p>
+            <a:pPr algn="ctr"/>
+            <a:endParaRPr b="0" lang="en-US" sz="2200" spc="-1" strike="noStrike">
+              <a:latin typeface="Arial"/>
+            </a:endParaRPr>
+          </a:p>
+        </p:txBody>
+      </p:sp>
+      <p:sp>
+        <p:nvSpPr>
+          <p:cNvPr id="89" name="TextShape 2"/>
+          <p:cNvSpPr txBox="1"/>
+          <p:nvPr/>
+        </p:nvSpPr>
+        <p:spPr>
+          <a:xfrm>
+            <a:off x="822960" y="365760"/>
+            <a:ext cx="5303520" cy="1005840"/>
+          </a:xfrm>
+          <a:prstGeom prst="rect">
+            <a:avLst/>
+          </a:prstGeom>
+          <a:noFill/>
+          <a:ln w="76320">
+            <a:solidFill>
+              <a:srgbClr val="000000"/>
+            </a:solidFill>
+            <a:round/>
+          </a:ln>
+        </p:spPr>
+        <p:txBody>
+          <a:bodyPr lIns="38160" rIns="38160" tIns="38160" bIns="38160" anchor="ctr">
+            <a:spAutoFit/>
+          </a:bodyPr>
+          <a:p>
+            <a:r>
+              <a:rPr b="1" lang="en-US" sz="3200" spc="-1" strike="noStrike">
+                <a:solidFill>
+                  <a:srgbClr val="333333"/>
+                </a:solidFill>
+                <a:latin typeface="Noto Sans Regular"/>
+              </a:rPr>
+              <a:t> </a:t>
+            </a:r>
+            <a:r>
+              <a:rPr b="1" lang="en-US" sz="3200" spc="-1" strike="noStrike">
+                <a:solidFill>
+                  <a:srgbClr val="333333"/>
+                </a:solidFill>
+                <a:latin typeface="Noto Sans Regular"/>
+              </a:rPr>
+              <a:t>Ficha de Rúbrica</a:t>
+            </a:r>
+            <a:endParaRPr b="1" lang="en-US" sz="3200" spc="-1" strike="noStrike">
+              <a:solidFill>
+                <a:srgbClr val="333333"/>
+              </a:solidFill>
+              <a:latin typeface="Noto Sans Regular"/>
+            </a:endParaRPr>
+          </a:p>
+        </p:txBody>
+      </p:sp>
       <p:pic>
         <p:nvPicPr>
           <p:cNvPr id="90" name="" descr=""/>
@@ -4948,13 +4759,12 @@
         </p:nvPicPr>
         <p:blipFill>
           <a:blip r:embed="rId1"/>
-          <a:srcRect l="0" t="0" r="28287" b="0"/>
           <a:stretch/>
         </p:blipFill>
         <p:spPr>
           <a:xfrm>
-            <a:off x="771840" y="1463040"/>
-            <a:ext cx="3708360" cy="4990680"/>
+            <a:off x="731520" y="1737360"/>
+            <a:ext cx="8412480" cy="4906440"/>
           </a:xfrm>
           <a:prstGeom prst="rect">
             <a:avLst/>
@@ -4964,191 +4774,6 @@
           </a:ln>
         </p:spPr>
       </p:pic>
-      <p:pic>
-        <p:nvPicPr>
-          <p:cNvPr id="91" name="" descr=""/>
-          <p:cNvPicPr/>
-          <p:nvPr/>
-        </p:nvPicPr>
-        <p:blipFill>
-          <a:blip r:embed="rId2"/>
-          <a:srcRect l="0" t="0" r="27904" b="0"/>
-          <a:stretch/>
-        </p:blipFill>
-        <p:spPr>
-          <a:xfrm>
-            <a:off x="5577840" y="1371600"/>
-            <a:ext cx="3748680" cy="4914720"/>
-          </a:xfrm>
-          <a:prstGeom prst="rect">
-            <a:avLst/>
-          </a:prstGeom>
-          <a:ln>
-            <a:noFill/>
-          </a:ln>
-        </p:spPr>
-      </p:pic>
-      <p:sp>
-        <p:nvSpPr>
-          <p:cNvPr id="92" name="TextShape 1"/>
-          <p:cNvSpPr txBox="1"/>
-          <p:nvPr/>
-        </p:nvSpPr>
-        <p:spPr>
-          <a:xfrm>
-            <a:off x="6640200" y="367200"/>
-            <a:ext cx="3090600" cy="1095840"/>
-          </a:xfrm>
-          <a:prstGeom prst="rect">
-            <a:avLst/>
-          </a:prstGeom>
-          <a:noFill/>
-          <a:ln>
-            <a:noFill/>
-          </a:ln>
-        </p:spPr>
-        <p:txBody>
-          <a:bodyPr lIns="90000" rIns="90000" tIns="45000" bIns="45000">
-            <a:spAutoFit/>
-          </a:bodyPr>
-          <a:p>
-            <a:pPr algn="ctr"/>
-            <a:r>
-              <a:rPr b="0" lang="en-US" sz="2200" spc="-1" strike="noStrike">
-                <a:solidFill>
-                  <a:srgbClr val="ff0000"/>
-                </a:solidFill>
-                <a:latin typeface="Cantarell Extra Bold"/>
-              </a:rPr>
-              <a:t>Administrador </a:t>
-            </a:r>
-            <a:endParaRPr b="0" lang="en-US" sz="2200" spc="-1" strike="noStrike">
-              <a:solidFill>
-                <a:srgbClr val="ff0000"/>
-              </a:solidFill>
-              <a:latin typeface="Cantarell Extra Bold"/>
-            </a:endParaRPr>
-          </a:p>
-          <a:p>
-            <a:pPr algn="ctr"/>
-            <a:r>
-              <a:rPr b="0" lang="en-US" sz="2200" spc="-1" strike="noStrike">
-                <a:solidFill>
-                  <a:srgbClr val="ff0000"/>
-                </a:solidFill>
-                <a:latin typeface="Cantarell Extra Bold"/>
-              </a:rPr>
-              <a:t>v/s </a:t>
-            </a:r>
-            <a:endParaRPr b="0" lang="en-US" sz="2200" spc="-1" strike="noStrike">
-              <a:solidFill>
-                <a:srgbClr val="ff0000"/>
-              </a:solidFill>
-              <a:latin typeface="Cantarell Extra Bold"/>
-            </a:endParaRPr>
-          </a:p>
-          <a:p>
-            <a:pPr algn="ctr"/>
-            <a:r>
-              <a:rPr b="0" lang="en-US" sz="2200" spc="-1" strike="noStrike">
-                <a:solidFill>
-                  <a:srgbClr val="ff0000"/>
-                </a:solidFill>
-                <a:latin typeface="Cantarell Extra Bold"/>
-              </a:rPr>
-              <a:t>Evaluador</a:t>
-            </a:r>
-            <a:endParaRPr b="0" lang="en-US" sz="2200" spc="-1" strike="noStrike">
-              <a:solidFill>
-                <a:srgbClr val="ff0000"/>
-              </a:solidFill>
-              <a:latin typeface="Cantarell Extra Bold"/>
-            </a:endParaRPr>
-          </a:p>
-        </p:txBody>
-      </p:sp>
-      <p:sp>
-        <p:nvSpPr>
-          <p:cNvPr id="93" name="TextShape 2"/>
-          <p:cNvSpPr txBox="1"/>
-          <p:nvPr/>
-        </p:nvSpPr>
-        <p:spPr>
-          <a:xfrm>
-            <a:off x="822960" y="365760"/>
-            <a:ext cx="5303520" cy="1005840"/>
-          </a:xfrm>
-          <a:prstGeom prst="rect">
-            <a:avLst/>
-          </a:prstGeom>
-          <a:noFill/>
-          <a:ln w="76320">
-            <a:solidFill>
-              <a:srgbClr val="000000"/>
-            </a:solidFill>
-            <a:round/>
-          </a:ln>
-        </p:spPr>
-        <p:txBody>
-          <a:bodyPr lIns="38160" rIns="38160" tIns="38160" bIns="38160" anchor="ctr">
-            <a:spAutoFit/>
-          </a:bodyPr>
-          <a:p>
-            <a:r>
-              <a:rPr b="1" lang="en-US" sz="3200" spc="-1" strike="noStrike">
-                <a:solidFill>
-                  <a:srgbClr val="333333"/>
-                </a:solidFill>
-                <a:latin typeface="Noto Sans Regular"/>
-              </a:rPr>
-              <a:t> </a:t>
-            </a:r>
-            <a:r>
-              <a:rPr b="1" lang="en-US" sz="3200" spc="-1" strike="noStrike">
-                <a:solidFill>
-                  <a:srgbClr val="333333"/>
-                </a:solidFill>
-                <a:latin typeface="Noto Sans Regular"/>
-              </a:rPr>
-              <a:t>Ficha de Rúbrica (1)</a:t>
-            </a:r>
-            <a:endParaRPr b="1" lang="en-US" sz="3200" spc="-1" strike="noStrike">
-              <a:solidFill>
-                <a:srgbClr val="333333"/>
-              </a:solidFill>
-              <a:latin typeface="Noto Sans Regular"/>
-            </a:endParaRPr>
-          </a:p>
-        </p:txBody>
-      </p:sp>
-      <p:sp>
-        <p:nvSpPr>
-          <p:cNvPr id="94" name="Line 3"/>
-          <p:cNvSpPr/>
-          <p:nvPr/>
-        </p:nvSpPr>
-        <p:spPr>
-          <a:xfrm>
-            <a:off x="5120640" y="1587240"/>
-            <a:ext cx="0" cy="4722120"/>
-          </a:xfrm>
-          <a:prstGeom prst="line">
-            <a:avLst/>
-          </a:prstGeom>
-          <a:ln w="57240">
-            <a:solidFill>
-              <a:srgbClr val="000000"/>
-            </a:solidFill>
-            <a:round/>
-          </a:ln>
-        </p:spPr>
-        <p:style>
-          <a:lnRef idx="0"/>
-          <a:fillRef idx="0"/>
-          <a:effectRef idx="0"/>
-          <a:fontRef idx="minor"/>
-        </p:style>
-      </p:sp>
     </p:spTree>
   </p:cSld>
   <mc:AlternateContent>
@@ -5208,13 +4833,13 @@
       </p:grpSpPr>
       <p:sp>
         <p:nvSpPr>
-          <p:cNvPr id="95" name="TextShape 1"/>
+          <p:cNvPr id="91" name="TextShape 1"/>
           <p:cNvSpPr txBox="1"/>
           <p:nvPr/>
         </p:nvSpPr>
         <p:spPr>
           <a:xfrm>
-            <a:off x="6640200" y="640080"/>
+            <a:off x="6640200" y="367200"/>
             <a:ext cx="3090600" cy="1095840"/>
           </a:xfrm>
           <a:prstGeom prst="rect">
@@ -5231,6 +4856,12 @@
           </a:bodyPr>
           <a:p>
             <a:pPr algn="ctr"/>
+            <a:endParaRPr b="0" lang="en-US" sz="1800" spc="-1" strike="noStrike">
+              <a:latin typeface="Arial"/>
+            </a:endParaRPr>
+          </a:p>
+          <a:p>
+            <a:pPr algn="ctr"/>
             <a:r>
               <a:rPr b="0" lang="en-US" sz="2200" spc="-1" strike="noStrike">
                 <a:solidFill>
@@ -5238,20 +4869,17 @@
                 </a:solidFill>
                 <a:latin typeface="Cantarell Extra Bold"/>
               </a:rPr>
-              <a:t>Administrador </a:t>
+              <a:t>Evaluador</a:t>
             </a:r>
             <a:endParaRPr b="0" lang="en-US" sz="2200" spc="-1" strike="noStrike">
-              <a:solidFill>
-                <a:srgbClr val="ff0000"/>
-              </a:solidFill>
-              <a:latin typeface="Cantarell Extra Bold"/>
-            </a:endParaRPr>
-          </a:p>
-        </p:txBody>
-      </p:sp>
-      <p:sp>
-        <p:nvSpPr>
-          <p:cNvPr id="96" name="TextShape 2"/>
+              <a:latin typeface="Arial"/>
+            </a:endParaRPr>
+          </a:p>
+        </p:txBody>
+      </p:sp>
+      <p:sp>
+        <p:nvSpPr>
+          <p:cNvPr id="92" name="TextShape 2"/>
           <p:cNvSpPr txBox="1"/>
           <p:nvPr/>
         </p:nvSpPr>
@@ -5305,7 +4933,7 @@
       </p:sp>
       <p:pic>
         <p:nvPicPr>
-          <p:cNvPr id="97" name="" descr=""/>
+          <p:cNvPr id="93" name="" descr=""/>
           <p:cNvPicPr/>
           <p:nvPr/>
         </p:nvPicPr>
@@ -5314,9 +4942,9 @@
           <a:stretch/>
         </p:blipFill>
         <p:spPr>
-          <a:xfrm rot="3600">
-            <a:off x="729000" y="1667520"/>
-            <a:ext cx="9070920" cy="4737960"/>
+          <a:xfrm>
+            <a:off x="1005840" y="1645920"/>
+            <a:ext cx="8445240" cy="5006880"/>
           </a:xfrm>
           <a:prstGeom prst="rect">
             <a:avLst/>
@@ -5385,13 +5013,13 @@
       </p:grpSpPr>
       <p:sp>
         <p:nvSpPr>
-          <p:cNvPr id="98" name="TextShape 1"/>
+          <p:cNvPr id="94" name="TextShape 1"/>
           <p:cNvSpPr txBox="1"/>
           <p:nvPr/>
         </p:nvSpPr>
         <p:spPr>
           <a:xfrm>
-            <a:off x="6640200" y="367200"/>
+            <a:off x="7406640" y="367200"/>
             <a:ext cx="3090600" cy="1095840"/>
           </a:xfrm>
           <a:prstGeom prst="rect">
@@ -5408,43 +5036,37 @@
           </a:bodyPr>
           <a:p>
             <a:pPr algn="ctr"/>
+            <a:endParaRPr b="0" lang="en-US" sz="1800" spc="-1" strike="noStrike">
+              <a:latin typeface="Arial"/>
+            </a:endParaRPr>
+          </a:p>
+          <a:p>
+            <a:pPr algn="ctr"/>
+            <a:r>
+              <a:rPr b="0" lang="en-US" sz="2200" spc="-1" strike="noStrike">
+                <a:solidFill>
+                  <a:srgbClr val="ff0000"/>
+                </a:solidFill>
+                <a:latin typeface="Cantarell Extra Bold"/>
+              </a:rPr>
+              <a:t>Administrador </a:t>
+            </a:r>
             <a:endParaRPr b="0" lang="en-US" sz="2200" spc="-1" strike="noStrike">
-              <a:solidFill>
-                <a:srgbClr val="ff0000"/>
-              </a:solidFill>
-              <a:latin typeface="Cantarell Extra Bold"/>
-            </a:endParaRPr>
-          </a:p>
-          <a:p>
-            <a:pPr algn="ctr"/>
-            <a:r>
-              <a:rPr b="0" lang="en-US" sz="2200" spc="-1" strike="noStrike">
-                <a:solidFill>
-                  <a:srgbClr val="ff0000"/>
-                </a:solidFill>
-                <a:latin typeface="Cantarell Extra Bold"/>
-              </a:rPr>
-              <a:t>Evaluador</a:t>
-            </a:r>
-            <a:endParaRPr b="0" lang="en-US" sz="2200" spc="-1" strike="noStrike">
-              <a:solidFill>
-                <a:srgbClr val="ff0000"/>
-              </a:solidFill>
-              <a:latin typeface="Cantarell Extra Bold"/>
-            </a:endParaRPr>
-          </a:p>
-        </p:txBody>
-      </p:sp>
-      <p:sp>
-        <p:nvSpPr>
-          <p:cNvPr id="99" name="TextShape 2"/>
+              <a:latin typeface="Arial"/>
+            </a:endParaRPr>
+          </a:p>
+        </p:txBody>
+      </p:sp>
+      <p:sp>
+        <p:nvSpPr>
+          <p:cNvPr id="95" name="TextShape 2"/>
           <p:cNvSpPr txBox="1"/>
           <p:nvPr/>
         </p:nvSpPr>
         <p:spPr>
           <a:xfrm>
-            <a:off x="822960" y="365760"/>
-            <a:ext cx="5303520" cy="1005840"/>
+            <a:off x="640080" y="277200"/>
+            <a:ext cx="7040880" cy="1183320"/>
           </a:xfrm>
           <a:prstGeom prst="rect">
             <a:avLst/>
@@ -5478,7 +5100,7 @@
                 </a:solidFill>
                 <a:latin typeface="Noto Sans Regular"/>
               </a:rPr>
-              <a:t>Ficha de Rúbrica (2)</a:t>
+              <a:t>Ficha de una evaluación (1)</a:t>
             </a:r>
             <a:endParaRPr b="1" lang="en-US" sz="3200" spc="-1" strike="noStrike">
               <a:solidFill>
@@ -5491,7 +5113,7 @@
       </p:sp>
       <p:pic>
         <p:nvPicPr>
-          <p:cNvPr id="100" name="" descr=""/>
+          <p:cNvPr id="96" name="" descr=""/>
           <p:cNvPicPr/>
           <p:nvPr/>
         </p:nvPicPr>
@@ -5501,8 +5123,8 @@
         </p:blipFill>
         <p:spPr>
           <a:xfrm>
-            <a:off x="694800" y="1859760"/>
-            <a:ext cx="8814960" cy="4358160"/>
+            <a:off x="731520" y="2168640"/>
+            <a:ext cx="8445240" cy="3957840"/>
           </a:xfrm>
           <a:prstGeom prst="rect">
             <a:avLst/>
@@ -5571,7 +5193,7 @@
       </p:grpSpPr>
       <p:sp>
         <p:nvSpPr>
-          <p:cNvPr id="101" name="TextShape 1"/>
+          <p:cNvPr id="97" name="TextShape 1"/>
           <p:cNvSpPr txBox="1"/>
           <p:nvPr/>
         </p:nvSpPr>
@@ -5594,6 +5216,12 @@
           </a:bodyPr>
           <a:p>
             <a:pPr algn="ctr"/>
+            <a:endParaRPr b="0" lang="en-US" sz="2200" spc="-1" strike="noStrike">
+              <a:latin typeface="Arial"/>
+            </a:endParaRPr>
+          </a:p>
+          <a:p>
+            <a:pPr algn="ctr"/>
             <a:r>
               <a:rPr b="0" lang="en-US" sz="2200" spc="-1" strike="noStrike">
                 <a:solidFill>
@@ -5601,56 +5229,17 @@
                 </a:solidFill>
                 <a:latin typeface="Cantarell Extra Bold"/>
               </a:rPr>
-              <a:t>Administrador </a:t>
+              <a:t>Evaluador</a:t>
             </a:r>
             <a:endParaRPr b="0" lang="en-US" sz="2200" spc="-1" strike="noStrike">
-              <a:solidFill>
-                <a:srgbClr val="ff0000"/>
-              </a:solidFill>
-              <a:latin typeface="Cantarell Extra Bold"/>
-            </a:endParaRPr>
-          </a:p>
-          <a:p>
-            <a:pPr algn="ctr"/>
-            <a:r>
-              <a:rPr b="0" lang="en-US" sz="2200" spc="-1" strike="noStrike">
-                <a:solidFill>
-                  <a:srgbClr val="ff0000"/>
-                </a:solidFill>
-                <a:latin typeface="Cantarell Extra Bold"/>
-              </a:rPr>
-              <a:t>v/s </a:t>
-            </a:r>
-            <a:endParaRPr b="0" lang="en-US" sz="2200" spc="-1" strike="noStrike">
-              <a:solidFill>
-                <a:srgbClr val="ff0000"/>
-              </a:solidFill>
-              <a:latin typeface="Cantarell Extra Bold"/>
-            </a:endParaRPr>
-          </a:p>
-          <a:p>
-            <a:pPr algn="ctr"/>
-            <a:r>
-              <a:rPr b="0" lang="en-US" sz="2200" spc="-1" strike="noStrike">
-                <a:solidFill>
-                  <a:srgbClr val="ff0000"/>
-                </a:solidFill>
-                <a:latin typeface="Cantarell Extra Bold"/>
-              </a:rPr>
-              <a:t>Evaluador</a:t>
-            </a:r>
-            <a:endParaRPr b="0" lang="en-US" sz="2200" spc="-1" strike="noStrike">
-              <a:solidFill>
-                <a:srgbClr val="ff0000"/>
-              </a:solidFill>
-              <a:latin typeface="Cantarell Extra Bold"/>
-            </a:endParaRPr>
-          </a:p>
-        </p:txBody>
-      </p:sp>
-      <p:sp>
-        <p:nvSpPr>
-          <p:cNvPr id="102" name="TextShape 2"/>
+              <a:latin typeface="Arial"/>
+            </a:endParaRPr>
+          </a:p>
+        </p:txBody>
+      </p:sp>
+      <p:sp>
+        <p:nvSpPr>
+          <p:cNvPr id="98" name="TextShape 2"/>
           <p:cNvSpPr txBox="1"/>
           <p:nvPr/>
         </p:nvSpPr>
@@ -5691,7 +5280,7 @@
                 </a:solidFill>
                 <a:latin typeface="Noto Sans Regular"/>
               </a:rPr>
-              <a:t>Ficha de una evaluación (1)</a:t>
+              <a:t>Ficha de una evaluación (2)</a:t>
             </a:r>
             <a:endParaRPr b="1" lang="en-US" sz="3200" spc="-1" strike="noStrike">
               <a:solidFill>
@@ -5704,7 +5293,7 @@
       </p:sp>
       <p:pic>
         <p:nvPicPr>
-          <p:cNvPr id="103" name="" descr=""/>
+          <p:cNvPr id="99" name="" descr=""/>
           <p:cNvPicPr/>
           <p:nvPr/>
         </p:nvPicPr>
@@ -5714,8 +5303,8 @@
         </p:blipFill>
         <p:spPr>
           <a:xfrm>
-            <a:off x="2103120" y="1572840"/>
-            <a:ext cx="2980800" cy="5010840"/>
+            <a:off x="640080" y="2011680"/>
+            <a:ext cx="8869680" cy="4158360"/>
           </a:xfrm>
           <a:prstGeom prst="rect">
             <a:avLst/>
@@ -5725,57 +5314,6 @@
           </a:ln>
         </p:spPr>
       </p:pic>
-      <p:pic>
-        <p:nvPicPr>
-          <p:cNvPr id="104" name="" descr=""/>
-          <p:cNvPicPr/>
-          <p:nvPr/>
-        </p:nvPicPr>
-        <p:blipFill>
-          <a:blip r:embed="rId2"/>
-          <a:stretch/>
-        </p:blipFill>
-        <p:spPr>
-          <a:xfrm>
-            <a:off x="5347800" y="1615680"/>
-            <a:ext cx="2790360" cy="4785120"/>
-          </a:xfrm>
-          <a:prstGeom prst="rect">
-            <a:avLst/>
-          </a:prstGeom>
-          <a:ln>
-            <a:noFill/>
-          </a:ln>
-        </p:spPr>
-      </p:pic>
-      <p:sp>
-        <p:nvSpPr>
-          <p:cNvPr id="105" name="Line 3"/>
-          <p:cNvSpPr/>
-          <p:nvPr/>
-        </p:nvSpPr>
-        <p:spPr>
-          <a:xfrm>
-            <a:off x="4937760" y="1678680"/>
-            <a:ext cx="0" cy="4722120"/>
-          </a:xfrm>
-          <a:prstGeom prst="line">
-            <a:avLst/>
-          </a:prstGeom>
-          <a:ln w="57240">
-            <a:solidFill>
-              <a:srgbClr val="000000"/>
-            </a:solidFill>
-            <a:round/>
-          </a:ln>
-        </p:spPr>
-        <p:style>
-          <a:lnRef idx="0"/>
-          <a:fillRef idx="0"/>
-          <a:effectRef idx="0"/>
-          <a:fontRef idx="minor"/>
-        </p:style>
-      </p:sp>
     </p:spTree>
   </p:cSld>
   <mc:AlternateContent>
@@ -5835,7 +5373,7 @@
       </p:grpSpPr>
       <p:sp>
         <p:nvSpPr>
-          <p:cNvPr id="106" name="TextShape 1"/>
+          <p:cNvPr id="100" name="TextShape 1"/>
           <p:cNvSpPr txBox="1"/>
           <p:nvPr/>
         </p:nvSpPr>
@@ -5868,10 +5406,7 @@
               <a:t>Administrador </a:t>
             </a:r>
             <a:endParaRPr b="0" lang="en-US" sz="2200" spc="-1" strike="noStrike">
-              <a:solidFill>
-                <a:srgbClr val="ff0000"/>
-              </a:solidFill>
-              <a:latin typeface="Cantarell Extra Bold"/>
+              <a:latin typeface="Arial"/>
             </a:endParaRPr>
           </a:p>
           <a:p>
@@ -5886,10 +5421,7 @@
               <a:t>v/s </a:t>
             </a:r>
             <a:endParaRPr b="0" lang="en-US" sz="2200" spc="-1" strike="noStrike">
-              <a:solidFill>
-                <a:srgbClr val="ff0000"/>
-              </a:solidFill>
-              <a:latin typeface="Cantarell Extra Bold"/>
+              <a:latin typeface="Arial"/>
             </a:endParaRPr>
           </a:p>
           <a:p>
@@ -5904,17 +5436,14 @@
               <a:t>Evaluador</a:t>
             </a:r>
             <a:endParaRPr b="0" lang="en-US" sz="2200" spc="-1" strike="noStrike">
-              <a:solidFill>
-                <a:srgbClr val="ff0000"/>
-              </a:solidFill>
-              <a:latin typeface="Cantarell Extra Bold"/>
-            </a:endParaRPr>
-          </a:p>
-        </p:txBody>
-      </p:sp>
-      <p:sp>
-        <p:nvSpPr>
-          <p:cNvPr id="107" name="TextShape 2"/>
+              <a:latin typeface="Arial"/>
+            </a:endParaRPr>
+          </a:p>
+        </p:txBody>
+      </p:sp>
+      <p:sp>
+        <p:nvSpPr>
+          <p:cNvPr id="101" name="TextShape 2"/>
           <p:cNvSpPr txBox="1"/>
           <p:nvPr/>
         </p:nvSpPr>
@@ -5955,7 +5484,7 @@
                 </a:solidFill>
                 <a:latin typeface="Noto Sans Regular"/>
               </a:rPr>
-              <a:t>Ficha de una evaluación (2)</a:t>
+              <a:t>Ficha de una evaluación (3)</a:t>
             </a:r>
             <a:endParaRPr b="1" lang="en-US" sz="3200" spc="-1" strike="noStrike">
               <a:solidFill>
@@ -5965,10 +5494,38 @@
             </a:endParaRPr>
           </a:p>
         </p:txBody>
+      </p:sp>
+      <p:sp>
+        <p:nvSpPr>
+          <p:cNvPr id="102" name="Line 3"/>
+          <p:cNvSpPr/>
+          <p:nvPr/>
+        </p:nvSpPr>
+        <p:spPr>
+          <a:xfrm>
+            <a:off x="4937760" y="1737360"/>
+            <a:ext cx="0" cy="4722120"/>
+          </a:xfrm>
+          <a:prstGeom prst="line">
+            <a:avLst/>
+          </a:prstGeom>
+          <a:ln w="57240">
+            <a:solidFill>
+              <a:srgbClr val="000000"/>
+            </a:solidFill>
+            <a:round/>
+          </a:ln>
+        </p:spPr>
+        <p:style>
+          <a:lnRef idx="0"/>
+          <a:fillRef idx="0"/>
+          <a:effectRef idx="0"/>
+          <a:fontRef idx="minor"/>
+        </p:style>
       </p:sp>
       <p:pic>
         <p:nvPicPr>
-          <p:cNvPr id="108" name="" descr=""/>
+          <p:cNvPr id="103" name="" descr=""/>
           <p:cNvPicPr/>
           <p:nvPr/>
         </p:nvPicPr>
@@ -5978,8 +5535,8 @@
         </p:blipFill>
         <p:spPr>
           <a:xfrm>
-            <a:off x="2651760" y="1737360"/>
-            <a:ext cx="2342880" cy="4676400"/>
+            <a:off x="640080" y="2562480"/>
+            <a:ext cx="4023360" cy="3381120"/>
           </a:xfrm>
           <a:prstGeom prst="rect">
             <a:avLst/>
@@ -5991,7 +5548,7 @@
       </p:pic>
       <p:pic>
         <p:nvPicPr>
-          <p:cNvPr id="109" name="" descr=""/>
+          <p:cNvPr id="104" name="" descr=""/>
           <p:cNvPicPr/>
           <p:nvPr/>
         </p:nvPicPr>
@@ -6001,8 +5558,8 @@
         </p:blipFill>
         <p:spPr>
           <a:xfrm>
-            <a:off x="5303520" y="1783440"/>
-            <a:ext cx="2418840" cy="4343040"/>
+            <a:off x="5394960" y="2509200"/>
+            <a:ext cx="4081320" cy="3590280"/>
           </a:xfrm>
           <a:prstGeom prst="rect">
             <a:avLst/>
@@ -6012,34 +5569,6 @@
           </a:ln>
         </p:spPr>
       </p:pic>
-      <p:sp>
-        <p:nvSpPr>
-          <p:cNvPr id="110" name="Line 3"/>
-          <p:cNvSpPr/>
-          <p:nvPr/>
-        </p:nvSpPr>
-        <p:spPr>
-          <a:xfrm>
-            <a:off x="4937760" y="1737360"/>
-            <a:ext cx="0" cy="4722120"/>
-          </a:xfrm>
-          <a:prstGeom prst="line">
-            <a:avLst/>
-          </a:prstGeom>
-          <a:ln w="57240">
-            <a:solidFill>
-              <a:srgbClr val="000000"/>
-            </a:solidFill>
-            <a:round/>
-          </a:ln>
-        </p:spPr>
-        <p:style>
-          <a:lnRef idx="0"/>
-          <a:fillRef idx="0"/>
-          <a:effectRef idx="0"/>
-          <a:fontRef idx="minor"/>
-        </p:style>
-      </p:sp>
     </p:spTree>
   </p:cSld>
   <mc:AlternateContent>
@@ -6099,7 +5628,7 @@
       </p:grpSpPr>
       <p:sp>
         <p:nvSpPr>
-          <p:cNvPr id="111" name="TextShape 1"/>
+          <p:cNvPr id="105" name="TextShape 1"/>
           <p:cNvSpPr txBox="1"/>
           <p:nvPr/>
         </p:nvSpPr>
@@ -6122,11 +5651,17 @@
           </a:bodyPr>
           <a:p>
             <a:pPr algn="ctr"/>
+            <a:r>
+              <a:rPr b="0" lang="en-US" sz="2200" spc="-1" strike="noStrike">
+                <a:solidFill>
+                  <a:srgbClr val="ff0000"/>
+                </a:solidFill>
+                <a:latin typeface="Cantarell Extra Bold"/>
+              </a:rPr>
+              <a:t>Administrador </a:t>
+            </a:r>
             <a:endParaRPr b="0" lang="en-US" sz="2200" spc="-1" strike="noStrike">
-              <a:solidFill>
-                <a:srgbClr val="ff0000"/>
-              </a:solidFill>
-              <a:latin typeface="Cantarell Extra Bold"/>
+              <a:latin typeface="Arial"/>
             </a:endParaRPr>
           </a:p>
           <a:p>
@@ -6138,20 +5673,32 @@
                 </a:solidFill>
                 <a:latin typeface="Cantarell Extra Bold"/>
               </a:rPr>
-              <a:t>Administrador </a:t>
+              <a:t>v/s </a:t>
             </a:r>
             <a:endParaRPr b="0" lang="en-US" sz="2200" spc="-1" strike="noStrike">
-              <a:solidFill>
-                <a:srgbClr val="ff0000"/>
-              </a:solidFill>
-              <a:latin typeface="Cantarell Extra Bold"/>
-            </a:endParaRPr>
-          </a:p>
-        </p:txBody>
-      </p:sp>
-      <p:sp>
-        <p:nvSpPr>
-          <p:cNvPr id="112" name="TextShape 2"/>
+              <a:latin typeface="Arial"/>
+            </a:endParaRPr>
+          </a:p>
+          <a:p>
+            <a:pPr algn="ctr"/>
+            <a:r>
+              <a:rPr b="0" lang="en-US" sz="2200" spc="-1" strike="noStrike">
+                <a:solidFill>
+                  <a:srgbClr val="ff0000"/>
+                </a:solidFill>
+                <a:latin typeface="Cantarell Extra Bold"/>
+              </a:rPr>
+              <a:t>Evaluador</a:t>
+            </a:r>
+            <a:endParaRPr b="0" lang="en-US" sz="2200" spc="-1" strike="noStrike">
+              <a:latin typeface="Arial"/>
+            </a:endParaRPr>
+          </a:p>
+        </p:txBody>
+      </p:sp>
+      <p:sp>
+        <p:nvSpPr>
+          <p:cNvPr id="106" name="TextShape 2"/>
           <p:cNvSpPr txBox="1"/>
           <p:nvPr/>
         </p:nvSpPr>
@@ -6192,7 +5739,7 @@
                 </a:solidFill>
                 <a:latin typeface="Noto Sans Regular"/>
               </a:rPr>
-              <a:t>Ficha de una evaluación (3)</a:t>
+              <a:t>Ficha de una evaluación (4)</a:t>
             </a:r>
             <a:endParaRPr b="1" lang="en-US" sz="3200" spc="-1" strike="noStrike">
               <a:solidFill>
@@ -6202,10 +5749,38 @@
             </a:endParaRPr>
           </a:p>
         </p:txBody>
+      </p:sp>
+      <p:sp>
+        <p:nvSpPr>
+          <p:cNvPr id="107" name="Line 3"/>
+          <p:cNvSpPr/>
+          <p:nvPr/>
+        </p:nvSpPr>
+        <p:spPr>
+          <a:xfrm>
+            <a:off x="4937760" y="1737360"/>
+            <a:ext cx="0" cy="4722120"/>
+          </a:xfrm>
+          <a:prstGeom prst="line">
+            <a:avLst/>
+          </a:prstGeom>
+          <a:ln w="57240">
+            <a:solidFill>
+              <a:srgbClr val="000000"/>
+            </a:solidFill>
+            <a:round/>
+          </a:ln>
+        </p:spPr>
+        <p:style>
+          <a:lnRef idx="0"/>
+          <a:fillRef idx="0"/>
+          <a:effectRef idx="0"/>
+          <a:fontRef idx="minor"/>
+        </p:style>
       </p:sp>
       <p:pic>
         <p:nvPicPr>
-          <p:cNvPr id="113" name="" descr=""/>
+          <p:cNvPr id="108" name="" descr=""/>
           <p:cNvPicPr/>
           <p:nvPr/>
         </p:nvPicPr>
@@ -6215,8 +5790,31 @@
         </p:blipFill>
         <p:spPr>
           <a:xfrm>
-            <a:off x="567000" y="1609200"/>
-            <a:ext cx="8869680" cy="4736520"/>
+            <a:off x="640080" y="2504160"/>
+            <a:ext cx="4057560" cy="3622320"/>
+          </a:xfrm>
+          <a:prstGeom prst="rect">
+            <a:avLst/>
+          </a:prstGeom>
+          <a:ln>
+            <a:noFill/>
+          </a:ln>
+        </p:spPr>
+      </p:pic>
+      <p:pic>
+        <p:nvPicPr>
+          <p:cNvPr id="109" name="" descr=""/>
+          <p:cNvPicPr/>
+          <p:nvPr/>
+        </p:nvPicPr>
+        <p:blipFill>
+          <a:blip r:embed="rId2"/>
+          <a:stretch/>
+        </p:blipFill>
+        <p:spPr>
+          <a:xfrm>
+            <a:off x="5212080" y="2560320"/>
+            <a:ext cx="4110840" cy="3575880"/>
           </a:xfrm>
           <a:prstGeom prst="rect">
             <a:avLst/>
@@ -6285,7 +5883,7 @@
       </p:grpSpPr>
       <p:sp>
         <p:nvSpPr>
-          <p:cNvPr id="114" name="TextShape 1"/>
+          <p:cNvPr id="110" name="TextShape 1"/>
           <p:cNvSpPr txBox="1"/>
           <p:nvPr/>
         </p:nvSpPr>
@@ -6308,11 +5906,17 @@
           </a:bodyPr>
           <a:p>
             <a:pPr algn="ctr"/>
+            <a:r>
+              <a:rPr b="0" lang="en-US" sz="2200" spc="-1" strike="noStrike">
+                <a:solidFill>
+                  <a:srgbClr val="ff0000"/>
+                </a:solidFill>
+                <a:latin typeface="Cantarell Extra Bold"/>
+              </a:rPr>
+              <a:t>Evaluador</a:t>
+            </a:r>
             <a:endParaRPr b="0" lang="en-US" sz="2200" spc="-1" strike="noStrike">
-              <a:solidFill>
-                <a:srgbClr val="ff0000"/>
-              </a:solidFill>
-              <a:latin typeface="Cantarell Extra Bold"/>
+              <a:latin typeface="Arial"/>
             </a:endParaRPr>
           </a:p>
           <a:p>
@@ -6324,20 +5928,32 @@
                 </a:solidFill>
                 <a:latin typeface="Cantarell Extra Bold"/>
               </a:rPr>
-              <a:t>Evaluador</a:t>
+              <a:t>Desde el</a:t>
             </a:r>
             <a:endParaRPr b="0" lang="en-US" sz="2200" spc="-1" strike="noStrike">
-              <a:solidFill>
-                <a:srgbClr val="ff0000"/>
-              </a:solidFill>
-              <a:latin typeface="Cantarell Extra Bold"/>
-            </a:endParaRPr>
-          </a:p>
-        </p:txBody>
-      </p:sp>
-      <p:sp>
-        <p:nvSpPr>
-          <p:cNvPr id="115" name="TextShape 2"/>
+              <a:latin typeface="Arial"/>
+            </a:endParaRPr>
+          </a:p>
+          <a:p>
+            <a:pPr algn="ctr"/>
+            <a:r>
+              <a:rPr b="0" lang="en-US" sz="2200" spc="-1" strike="noStrike">
+                <a:solidFill>
+                  <a:srgbClr val="ff0000"/>
+                </a:solidFill>
+                <a:latin typeface="Cantarell Extra Bold"/>
+              </a:rPr>
+              <a:t>Celular</a:t>
+            </a:r>
+            <a:endParaRPr b="0" lang="en-US" sz="2200" spc="-1" strike="noStrike">
+              <a:latin typeface="Arial"/>
+            </a:endParaRPr>
+          </a:p>
+        </p:txBody>
+      </p:sp>
+      <p:sp>
+        <p:nvSpPr>
+          <p:cNvPr id="111" name="TextShape 2"/>
           <p:cNvSpPr txBox="1"/>
           <p:nvPr/>
         </p:nvSpPr>
@@ -6378,7 +5994,7 @@
                 </a:solidFill>
                 <a:latin typeface="Noto Sans Regular"/>
               </a:rPr>
-              <a:t>Ficha de una evaluación (3)</a:t>
+              <a:t>Ficha de una evaluación (5)</a:t>
             </a:r>
             <a:endParaRPr b="1" lang="en-US" sz="3200" spc="-1" strike="noStrike">
               <a:solidFill>
@@ -6388,10 +6004,38 @@
             </a:endParaRPr>
           </a:p>
         </p:txBody>
+      </p:sp>
+      <p:sp>
+        <p:nvSpPr>
+          <p:cNvPr id="112" name="Line 3"/>
+          <p:cNvSpPr/>
+          <p:nvPr/>
+        </p:nvSpPr>
+        <p:spPr>
+          <a:xfrm>
+            <a:off x="5029200" y="1828800"/>
+            <a:ext cx="0" cy="4722120"/>
+          </a:xfrm>
+          <a:prstGeom prst="line">
+            <a:avLst/>
+          </a:prstGeom>
+          <a:ln w="57240">
+            <a:solidFill>
+              <a:srgbClr val="000000"/>
+            </a:solidFill>
+            <a:round/>
+          </a:ln>
+        </p:spPr>
+        <p:style>
+          <a:lnRef idx="0"/>
+          <a:fillRef idx="0"/>
+          <a:effectRef idx="0"/>
+          <a:fontRef idx="minor"/>
+        </p:style>
       </p:sp>
       <p:pic>
         <p:nvPicPr>
-          <p:cNvPr id="116" name="" descr=""/>
+          <p:cNvPr id="113" name="" descr=""/>
           <p:cNvPicPr/>
           <p:nvPr/>
         </p:nvPicPr>
@@ -6401,8 +6045,31 @@
         </p:blipFill>
         <p:spPr>
           <a:xfrm>
-            <a:off x="329040" y="1828800"/>
-            <a:ext cx="9235440" cy="4555080"/>
+            <a:off x="1463040" y="1786320"/>
+            <a:ext cx="3017520" cy="5346000"/>
+          </a:xfrm>
+          <a:prstGeom prst="rect">
+            <a:avLst/>
+          </a:prstGeom>
+          <a:ln>
+            <a:noFill/>
+          </a:ln>
+        </p:spPr>
+      </p:pic>
+      <p:pic>
+        <p:nvPicPr>
+          <p:cNvPr id="114" name="" descr=""/>
+          <p:cNvPicPr/>
+          <p:nvPr/>
+        </p:nvPicPr>
+        <p:blipFill>
+          <a:blip r:embed="rId2"/>
+          <a:stretch/>
+        </p:blipFill>
+        <p:spPr>
+          <a:xfrm>
+            <a:off x="5577840" y="1813680"/>
+            <a:ext cx="3002760" cy="5318640"/>
           </a:xfrm>
           <a:prstGeom prst="rect">
             <a:avLst/>

</xml_diff>